<commit_message>
Update the CNTK on PySpark deck with new content
</commit_message>
<xml_diff>
--- a/Deep Learning and the Microsoft Cognitive Toolkit/CNTK on Spark/CNTK-PySpark.pptx
+++ b/Deep Learning and the Microsoft Cognitive Toolkit/CNTK on Spark/CNTK-PySpark.pptx
@@ -17,7 +17,7 @@
     <p:sldId id="1553" r:id="rId8"/>
     <p:sldId id="1557" r:id="rId9"/>
     <p:sldId id="1559" r:id="rId10"/>
-    <p:sldId id="1558" r:id="rId11"/>
+    <p:sldId id="1561" r:id="rId11"/>
     <p:sldId id="1555" r:id="rId12"/>
     <p:sldId id="1554" r:id="rId13"/>
     <p:sldId id="1556" r:id="rId14"/>
@@ -145,7 +145,7 @@
             <p14:sldId id="1553"/>
             <p14:sldId id="1557"/>
             <p14:sldId id="1559"/>
-            <p14:sldId id="1558"/>
+            <p14:sldId id="1561"/>
             <p14:sldId id="1555"/>
             <p14:sldId id="1554"/>
             <p14:sldId id="1556"/>
@@ -299,7 +299,7 @@
               <a:rPr lang="en-US" smtClean="0">
                 <a:latin typeface="Segoe UI" pitchFamily="34" charset="0"/>
               </a:rPr>
-              <a:t>5/8/2017 5:25 AM</a:t>
+              <a:t>5/9/2017 5:33 PM</a:t>
             </a:fld>
             <a:endParaRPr lang="en-US" dirty="0">
               <a:latin typeface="Segoe UI" pitchFamily="34" charset="0"/>
@@ -596,7 +596,7 @@
           <a:p>
             <a:fld id="{D18B56EA-E28F-4F92-9F16-7A6F2501B303}" type="datetime8">
               <a:rPr lang="en-US" smtClean="0"/>
-              <a:t>5/7/2017 9:19 PM</a:t>
+              <a:t>5/9/2017 5:13 PM</a:t>
             </a:fld>
             <a:endParaRPr lang="en-US" dirty="0"/>
           </a:p>
@@ -982,7 +982,7 @@
           <a:p>
             <a:fld id="{88B44C4B-E218-4158-810E-47EF8FD635FD}" type="datetime8">
               <a:rPr lang="en-US" smtClean="0"/>
-              <a:t>5/7/2017 9:19 PM</a:t>
+              <a:t>5/9/2017 5:13 PM</a:t>
             </a:fld>
             <a:endParaRPr lang="en-US" dirty="0"/>
           </a:p>
@@ -1167,7 +1167,7 @@
           <a:p>
             <a:fld id="{D18B56EA-E28F-4F92-9F16-7A6F2501B303}" type="datetime8">
               <a:rPr lang="en-US" smtClean="0"/>
-              <a:t>5/8/2017 5:40 AM</a:t>
+              <a:t>5/9/2017 5:13 PM</a:t>
             </a:fld>
             <a:endParaRPr lang="en-US" dirty="0"/>
           </a:p>
@@ -1351,7 +1351,7 @@
           <a:p>
             <a:fld id="{627F603A-779F-4101-9B83-C34650C566A7}" type="datetime8">
               <a:rPr lang="en-US" smtClean="0"/>
-              <a:t>5/8/2017 6:02 AM</a:t>
+              <a:t>5/9/2017 5:13 PM</a:t>
             </a:fld>
             <a:endParaRPr lang="en-US" dirty="0"/>
           </a:p>
@@ -1535,7 +1535,7 @@
           <a:p>
             <a:fld id="{C9F26854-F9AE-4E32-B2A5-59EE421C280D}" type="datetime8">
               <a:rPr lang="en-US" smtClean="0"/>
-              <a:t>5/7/2017 9:19 PM</a:t>
+              <a:t>5/9/2017 5:13 PM</a:t>
             </a:fld>
             <a:endParaRPr lang="en-US" dirty="0"/>
           </a:p>
@@ -1667,7 +1667,7 @@
           <a:p>
             <a:fld id="{C279D0AF-5102-465F-9774-3BAAD6555D09}" type="datetime8">
               <a:rPr lang="en-US" smtClean="0"/>
-              <a:t>5/7/2017 9:19 PM</a:t>
+              <a:t>5/9/2017 5:13 PM</a:t>
             </a:fld>
             <a:endParaRPr lang="en-US" dirty="0"/>
           </a:p>
@@ -1853,7 +1853,7 @@
           <a:p>
             <a:fld id="{26EED51F-96EB-4E4E-9B3B-EAE92F3CF0A4}" type="datetime8">
               <a:rPr lang="en-US" smtClean="0"/>
-              <a:t>5/7/2017 9:19 PM</a:t>
+              <a:t>5/9/2017 5:13 PM</a:t>
             </a:fld>
             <a:endParaRPr lang="en-US" dirty="0"/>
           </a:p>
@@ -2121,7 +2121,7 @@
           <a:p>
             <a:fld id="{5843A5E2-72BF-4A4D-8E2C-055703D20464}" type="datetime8">
               <a:rPr lang="en-US" smtClean="0"/>
-              <a:t>5/7/2017 9:19 PM</a:t>
+              <a:t>5/9/2017 5:13 PM</a:t>
             </a:fld>
             <a:endParaRPr lang="en-US" dirty="0"/>
           </a:p>
@@ -2251,7 +2251,7 @@
           <a:p>
             <a:fld id="{4ABBAF79-65C1-40FB-946E-BA24F1390D51}" type="datetime8">
               <a:rPr lang="en-US" smtClean="0"/>
-              <a:t>5/7/2017 9:19 PM</a:t>
+              <a:t>5/9/2017 5:13 PM</a:t>
             </a:fld>
             <a:endParaRPr lang="en-US" dirty="0"/>
           </a:p>
@@ -2489,7 +2489,7 @@
           <a:p>
             <a:fld id="{E00EAA4D-60CF-44E7-B563-E3DDB1E14225}" type="datetime8">
               <a:rPr lang="en-US" smtClean="0"/>
-              <a:t>5/7/2017 9:19 PM</a:t>
+              <a:t>5/9/2017 5:13 PM</a:t>
             </a:fld>
             <a:endParaRPr lang="en-US"/>
           </a:p>
@@ -2672,7 +2672,7 @@
           <a:p>
             <a:fld id="{627F603A-779F-4101-9B83-C34650C566A7}" type="datetime8">
               <a:rPr lang="en-US" smtClean="0"/>
-              <a:t>5/7/2017 9:19 PM</a:t>
+              <a:t>5/9/2017 5:13 PM</a:t>
             </a:fld>
             <a:endParaRPr lang="en-US" dirty="0"/>
           </a:p>
@@ -2856,7 +2856,7 @@
           <a:p>
             <a:fld id="{FD545570-6992-4320-BEFC-9262493433EC}" type="datetime8">
               <a:rPr lang="en-US" smtClean="0"/>
-              <a:t>5/7/2017 9:19 PM</a:t>
+              <a:t>5/9/2017 5:13 PM</a:t>
             </a:fld>
             <a:endParaRPr lang="en-US" dirty="0"/>
           </a:p>
@@ -3040,7 +3040,7 @@
           <a:p>
             <a:fld id="{8683C9CD-37C6-4B53-B210-CC8F66F90493}" type="datetime8">
               <a:rPr lang="en-US" smtClean="0"/>
-              <a:t>5/7/2017 9:19 PM</a:t>
+              <a:t>5/9/2017 5:13 PM</a:t>
             </a:fld>
             <a:endParaRPr lang="en-US" dirty="0"/>
           </a:p>
@@ -3224,7 +3224,7 @@
           <a:p>
             <a:fld id="{0F1DD190-47F2-4EC2-A20D-7847072E60CD}" type="datetime8">
               <a:rPr lang="en-US" smtClean="0"/>
-              <a:t>5/7/2017 9:19 PM</a:t>
+              <a:t>5/9/2017 5:13 PM</a:t>
             </a:fld>
             <a:endParaRPr lang="en-US" dirty="0"/>
           </a:p>
@@ -3408,7 +3408,7 @@
           <a:p>
             <a:fld id="{0F1DD190-47F2-4EC2-A20D-7847072E60CD}" type="datetime8">
               <a:rPr lang="en-US" smtClean="0"/>
-              <a:t>5/7/2017 9:19 PM</a:t>
+              <a:t>5/9/2017 5:13 PM</a:t>
             </a:fld>
             <a:endParaRPr lang="en-US" dirty="0"/>
           </a:p>
@@ -3592,7 +3592,7 @@
           <a:p>
             <a:fld id="{0F1DD190-47F2-4EC2-A20D-7847072E60CD}" type="datetime8">
               <a:rPr lang="en-US" smtClean="0"/>
-              <a:t>5/7/2017 9:19 PM</a:t>
+              <a:t>5/9/2017 5:13 PM</a:t>
             </a:fld>
             <a:endParaRPr lang="en-US" dirty="0"/>
           </a:p>
@@ -3724,7 +3724,7 @@
           <a:p>
             <a:fld id="{E45DD59A-D9AD-4C82-9DE1-A42A8DB4D1E1}" type="datetime8">
               <a:rPr lang="en-US" smtClean="0"/>
-              <a:t>5/7/2017 9:19 PM</a:t>
+              <a:t>5/9/2017 5:13 PM</a:t>
             </a:fld>
             <a:endParaRPr lang="en-US" dirty="0"/>
           </a:p>
@@ -3929,7 +3929,7 @@
                   <a:prstClr val="black"/>
                 </a:solidFill>
               </a:rPr>
-              <a:t>5/7/2017 9:19 PM</a:t>
+              <a:t>5/9/2017 5:13 PM</a:t>
             </a:fld>
             <a:endParaRPr lang="en-US" dirty="0">
               <a:solidFill>
@@ -4148,7 +4148,7 @@
                   <a:prstClr val="black"/>
                 </a:solidFill>
               </a:rPr>
-              <a:t>5/7/2017 9:19 PM</a:t>
+              <a:t>5/9/2017 5:13 PM</a:t>
             </a:fld>
             <a:endParaRPr lang="en-US" dirty="0">
               <a:solidFill>
@@ -4561,7 +4561,7 @@
           <a:p>
             <a:fld id="{EA2B2ED8-C573-45EF-BF68-CEC19505703A}" type="datetime8">
               <a:rPr lang="en-US" smtClean="0"/>
-              <a:t>5/8/2017 5:39 AM</a:t>
+              <a:t>5/9/2017 5:13 PM</a:t>
             </a:fld>
             <a:endParaRPr lang="en-US" dirty="0"/>
           </a:p>
@@ -4814,7 +4814,7 @@
           <a:p>
             <a:fld id="{D18B56EA-E28F-4F92-9F16-7A6F2501B303}" type="datetime8">
               <a:rPr lang="en-US" smtClean="0"/>
-              <a:t>5/8/2017 5:40 AM</a:t>
+              <a:t>5/9/2017 5:13 PM</a:t>
             </a:fld>
             <a:endParaRPr lang="en-US" dirty="0"/>
           </a:p>
@@ -4999,7 +4999,7 @@
           <a:p>
             <a:fld id="{D18B56EA-E28F-4F92-9F16-7A6F2501B303}" type="datetime8">
               <a:rPr lang="en-US" smtClean="0"/>
-              <a:t>5/8/2017 5:40 AM</a:t>
+              <a:t>5/9/2017 5:13 PM</a:t>
             </a:fld>
             <a:endParaRPr lang="en-US" dirty="0"/>
           </a:p>
@@ -5184,7 +5184,7 @@
           <a:p>
             <a:fld id="{D18B56EA-E28F-4F92-9F16-7A6F2501B303}" type="datetime8">
               <a:rPr lang="en-US" smtClean="0"/>
-              <a:t>5/8/2017 6:01 AM</a:t>
+              <a:t>5/9/2017 5:13 PM</a:t>
             </a:fld>
             <a:endParaRPr lang="en-US" dirty="0"/>
           </a:p>
@@ -5369,7 +5369,7 @@
           <a:p>
             <a:fld id="{D18B56EA-E28F-4F92-9F16-7A6F2501B303}" type="datetime8">
               <a:rPr lang="en-US" smtClean="0"/>
-              <a:t>5/8/2017 5:40 AM</a:t>
+              <a:t>5/9/2017 5:13 PM</a:t>
             </a:fld>
             <a:endParaRPr lang="en-US" dirty="0"/>
           </a:p>
@@ -5402,7 +5402,7 @@
     </p:spTree>
     <p:extLst>
       <p:ext uri="{BB962C8B-B14F-4D97-AF65-F5344CB8AC3E}">
-        <p14:creationId xmlns:p14="http://schemas.microsoft.com/office/powerpoint/2010/main" val="3546305990"/>
+        <p14:creationId xmlns:p14="http://schemas.microsoft.com/office/powerpoint/2010/main" val="4193165158"/>
       </p:ext>
     </p:extLst>
   </p:cSld>
@@ -5554,7 +5554,7 @@
           <a:p>
             <a:fld id="{D18B56EA-E28F-4F92-9F16-7A6F2501B303}" type="datetime8">
               <a:rPr lang="en-US" smtClean="0"/>
-              <a:t>5/8/2017 6:16 AM</a:t>
+              <a:t>5/9/2017 5:13 PM</a:t>
             </a:fld>
             <a:endParaRPr lang="en-US" dirty="0"/>
           </a:p>
@@ -5739,7 +5739,7 @@
           <a:p>
             <a:fld id="{D18B56EA-E28F-4F92-9F16-7A6F2501B303}" type="datetime8">
               <a:rPr lang="en-US" smtClean="0"/>
-              <a:t>5/8/2017 5:40 AM</a:t>
+              <a:t>5/9/2017 5:13 PM</a:t>
             </a:fld>
             <a:endParaRPr lang="en-US" dirty="0"/>
           </a:p>
@@ -12187,7 +12187,7 @@
           <a:p>
             <a:r>
               <a:rPr lang="en-US" dirty="0"/>
-              <a:t>Image loading and distribution</a:t>
+              <a:t>Model loading and distribution</a:t>
             </a:r>
           </a:p>
         </p:txBody>
@@ -12205,7 +12205,7 @@
         <p:spPr>
           <a:xfrm>
             <a:off x="274702" y="1211287"/>
-            <a:ext cx="11888787" cy="683264"/>
+            <a:ext cx="11888787" cy="4118050"/>
           </a:xfrm>
         </p:spPr>
         <p:txBody>
@@ -12215,11 +12215,65 @@
             <a:pPr algn="just"/>
             <a:r>
               <a:rPr lang="en-US" dirty="0"/>
-              <a:t>Currently, no convenient mechanism </a:t>
-            </a:r>
-            <a:r>
-              <a:rPr lang="en-US"/>
-              <a:t>to load from WASB</a:t>
+              <a:t>Stage model file to HDFS </a:t>
+            </a:r>
+          </a:p>
+          <a:p>
+            <a:pPr algn="just"/>
+            <a:r>
+              <a:rPr lang="en-US" dirty="0"/>
+              <a:t>Use </a:t>
+            </a:r>
+            <a:r>
+              <a:rPr lang="en-US" dirty="0" err="1">
+                <a:latin typeface="Consolas" panose="020B0609020204030204" pitchFamily="49" charset="0"/>
+              </a:rPr>
+              <a:t>sc.addFiles</a:t>
+            </a:r>
+            <a:r>
+              <a:rPr lang="en-US" dirty="0"/>
+              <a:t> to replicate the model to all worker nodes</a:t>
+            </a:r>
+          </a:p>
+          <a:p>
+            <a:pPr algn="just"/>
+            <a:r>
+              <a:rPr lang="en-US" dirty="0"/>
+              <a:t>On each worker, use </a:t>
+            </a:r>
+            <a:r>
+              <a:rPr lang="en-US" dirty="0" err="1">
+                <a:latin typeface="Consolas" panose="020B0609020204030204" pitchFamily="49" charset="0"/>
+              </a:rPr>
+              <a:t>SparkFiles.get</a:t>
+            </a:r>
+            <a:r>
+              <a:rPr lang="en-US" dirty="0"/>
+              <a:t> to get the local path to model file</a:t>
+            </a:r>
+          </a:p>
+          <a:p>
+            <a:pPr algn="just"/>
+            <a:r>
+              <a:rPr lang="en-US" dirty="0"/>
+              <a:t>Initialize model from local file inside UDF</a:t>
+            </a:r>
+          </a:p>
+          <a:p>
+            <a:pPr lvl="1" algn="just"/>
+            <a:r>
+              <a:rPr lang="en-US" dirty="0"/>
+              <a:t>Use </a:t>
+            </a:r>
+            <a:r>
+              <a:rPr lang="en-US" dirty="0" err="1">
+                <a:latin typeface="Consolas" panose="020B0609020204030204" pitchFamily="49" charset="0"/>
+              </a:rPr>
+              <a:t>sc.mapPartitions</a:t>
+            </a:r>
+            <a:r>
+              <a:rPr lang="en-US" dirty="0"/>
+              <a:t> to only load model once per worker </a:t>
             </a:r>
           </a:p>
         </p:txBody>
@@ -15601,29 +15655,36 @@
           <a:lstStyle/>
           <a:p>
             <a:r>
-              <a:rPr lang="en-US" dirty="0" err="1"/>
-              <a:t>Sudarshan</a:t>
+              <a:rPr lang="en-US" dirty="0"/>
+              <a:t>Sudarshan Raghunathan</a:t>
+            </a:r>
+          </a:p>
+          <a:p>
+            <a:r>
+              <a:rPr lang="en-US" dirty="0">
+                <a:hlinkClick r:id="rId3"/>
+              </a:rPr>
+              <a:t>susudars@microsoft.com</a:t>
             </a:r>
             <a:r>
               <a:rPr lang="en-US" dirty="0"/>
               <a:t> </a:t>
             </a:r>
-            <a:r>
-              <a:rPr lang="en-US" dirty="0" err="1"/>
-              <a:t>Raghunathan</a:t>
-            </a:r>
+          </a:p>
+          <a:p>
+            <a:r>
+              <a:rPr lang="en-US" dirty="0"/>
+              <a:t>Principal SWE Manager, AzureML</a:t>
+            </a:r>
+          </a:p>
+          <a:p>
             <a:endParaRPr lang="en-US" dirty="0"/>
           </a:p>
           <a:p>
             <a:r>
               <a:rPr lang="en-US" dirty="0"/>
-              <a:t>Principal SWE Manager, </a:t>
-            </a:r>
-            <a:r>
-              <a:rPr lang="en-US" dirty="0" err="1"/>
-              <a:t>AzureML</a:t>
-            </a:r>
-            <a:endParaRPr lang="en-US" dirty="0"/>
+              <a:t>(joint work with Miruna Oprescu and Mary Wahl)</a:t>
+            </a:r>
           </a:p>
         </p:txBody>
       </p:sp>
@@ -16142,13 +16203,19 @@
         <p:spPr>
           <a:xfrm>
             <a:off x="274702" y="1211287"/>
-            <a:ext cx="11888787" cy="4339650"/>
+            <a:ext cx="11888787" cy="3730252"/>
           </a:xfrm>
         </p:spPr>
         <p:txBody>
           <a:bodyPr/>
           <a:lstStyle/>
           <a:p>
+            <a:r>
+              <a:rPr lang="en-US" dirty="0"/>
+              <a:t>Scenarios for scoring and transfer learning on Spark</a:t>
+            </a:r>
+          </a:p>
+          <a:p>
             <a:pPr lvl="0"/>
             <a:r>
               <a:rPr lang="en-US" dirty="0"/>
@@ -16159,14 +16226,6 @@
             <a:pPr lvl="0"/>
             <a:r>
               <a:rPr lang="en-US" dirty="0"/>
-              <a:t>Scenarios for scoring and transfer learning on Spark</a:t>
-            </a:r>
-            <a:endParaRPr lang="en-US" dirty="0"/>
-          </a:p>
-          <a:p>
-            <a:pPr lvl="0"/>
-            <a:r>
-              <a:rPr lang="en-US" dirty="0"/>
               <a:t>Setup and configuration</a:t>
             </a:r>
           </a:p>
@@ -16182,13 +16241,6 @@
             <a:r>
               <a:rPr lang="en-US" dirty="0"/>
               <a:t>Model loading and distribution</a:t>
-            </a:r>
-          </a:p>
-          <a:p>
-            <a:pPr lvl="0"/>
-            <a:r>
-              <a:rPr lang="en-US" dirty="0"/>
-              <a:t>Operationalizing models</a:t>
             </a:r>
           </a:p>
           <a:p>
@@ -16277,7 +16329,7 @@
         <p:spPr>
           <a:xfrm>
             <a:off x="274702" y="1211287"/>
-            <a:ext cx="11888787" cy="5626156"/>
+            <a:ext cx="11888787" cy="5152180"/>
           </a:xfrm>
         </p:spPr>
         <p:txBody>
@@ -16322,7 +16374,15 @@
             <a:pPr lvl="1" algn="just"/>
             <a:r>
               <a:rPr lang="en-US" dirty="0"/>
-              <a:t>Up to 80x faster than Hadoop</a:t>
+              <a:t>Up </a:t>
+            </a:r>
+            <a:r>
+              <a:rPr lang="en-US"/>
+              <a:t>to 100x </a:t>
+            </a:r>
+            <a:r>
+              <a:rPr lang="en-US" dirty="0"/>
+              <a:t>faster than Hadoop</a:t>
             </a:r>
           </a:p>
           <a:p>
@@ -16375,14 +16435,7 @@
             <a:pPr algn="just"/>
             <a:r>
               <a:rPr lang="en-US" dirty="0"/>
-              <a:t>Rich ecosystem of libraries</a:t>
-            </a:r>
-          </a:p>
-          <a:p>
-            <a:pPr lvl="1" algn="just"/>
-            <a:r>
-              <a:rPr lang="en-US" dirty="0"/>
-              <a:t>SQL, ML, Streaming</a:t>
+              <a:t>Rich ecosystem of libraries: SQL, ML, Streaming</a:t>
             </a:r>
             <a:endParaRPr lang="en-US" dirty="0">
               <a:latin typeface="Consolas" panose="020B0609020204030204" pitchFamily="49" charset="0"/>
@@ -16440,7 +16493,7 @@
           <a:p>
             <a:r>
               <a:rPr lang="en-US" dirty="0"/>
-              <a:t>Spark Basics</a:t>
+              <a:t>Spark basics</a:t>
             </a:r>
           </a:p>
         </p:txBody>
@@ -16458,22 +16511,88 @@
         <p:spPr>
           <a:xfrm>
             <a:off x="274702" y="1211287"/>
-            <a:ext cx="11888787" cy="1292662"/>
+            <a:ext cx="11888787" cy="5219891"/>
           </a:xfrm>
         </p:spPr>
         <p:txBody>
           <a:bodyPr/>
           <a:lstStyle/>
           <a:p>
+            <a:pPr algn="just"/>
+            <a:r>
+              <a:rPr lang="en-US" dirty="0"/>
+              <a:t>Spark context and Spark session</a:t>
+            </a:r>
+          </a:p>
+          <a:p>
+            <a:pPr lvl="1" algn="just"/>
+            <a:r>
+              <a:rPr lang="en-US" dirty="0"/>
+              <a:t>“Connection” objects to “resources” that enable distributed execution</a:t>
+            </a:r>
+          </a:p>
+          <a:p>
+            <a:pPr algn="just"/>
             <a:r>
               <a:rPr lang="en-US" dirty="0"/>
               <a:t>RDDs</a:t>
             </a:r>
           </a:p>
           <a:p>
+            <a:pPr lvl="1" algn="just"/>
             <a:r>
               <a:rPr lang="en-US" dirty="0"/>
-              <a:t>Spark context</a:t>
+              <a:t>Fundamental data structure abstraction in Spark</a:t>
+            </a:r>
+          </a:p>
+          <a:p>
+            <a:pPr lvl="1" algn="just"/>
+            <a:r>
+              <a:rPr lang="en-US" dirty="0"/>
+              <a:t>Represents an immutable, partitioned collection of data </a:t>
+            </a:r>
+          </a:p>
+          <a:p>
+            <a:pPr lvl="1" algn="just"/>
+            <a:r>
+              <a:rPr lang="en-US" dirty="0"/>
+              <a:t>Contains methods for operating on data in parallel</a:t>
+            </a:r>
+          </a:p>
+          <a:p>
+            <a:pPr lvl="1" algn="just"/>
+            <a:r>
+              <a:rPr lang="en-US" dirty="0"/>
+              <a:t>“</a:t>
+            </a:r>
+            <a:r>
+              <a:rPr lang="en-US" dirty="0" err="1"/>
+              <a:t>Resiliancy</a:t>
+            </a:r>
+            <a:r>
+              <a:rPr lang="en-US" dirty="0"/>
+              <a:t>” = “Immutability” + “No side effecting operations”</a:t>
+            </a:r>
+          </a:p>
+          <a:p>
+            <a:pPr algn="just"/>
+            <a:r>
+              <a:rPr lang="en-US" dirty="0"/>
+              <a:t>Data frames</a:t>
+            </a:r>
+          </a:p>
+          <a:p>
+            <a:pPr lvl="1" algn="just"/>
+            <a:r>
+              <a:rPr lang="en-US" dirty="0"/>
+              <a:t>Schematized tabular data structures </a:t>
+            </a:r>
+          </a:p>
+          <a:p>
+            <a:pPr lvl="1" algn="just"/>
+            <a:r>
+              <a:rPr lang="en-US" dirty="0"/>
+              <a:t>Support for SQL queries with query planning and optimization </a:t>
             </a:r>
           </a:p>
         </p:txBody>
@@ -16546,7 +16665,7 @@
         <p:spPr>
           <a:xfrm>
             <a:off x="274702" y="1211287"/>
-            <a:ext cx="11888787" cy="5355312"/>
+            <a:ext cx="11888787" cy="5219891"/>
           </a:xfrm>
         </p:spPr>
         <p:txBody>
@@ -16619,7 +16738,11 @@
             </a:r>
           </a:p>
           <a:p>
-            <a:endParaRPr lang="en-US" dirty="0"/>
+            <a:pPr lvl="1"/>
+            <a:r>
+              <a:rPr lang="en-US" dirty="0"/>
+              <a:t>No GPU VMs on HDInsight</a:t>
+            </a:r>
           </a:p>
         </p:txBody>
       </p:sp>
@@ -16673,89 +16796,87 @@
           <a:p>
             <a:r>
               <a:rPr lang="en-US" dirty="0"/>
-              <a:t>Image processing on PySpark – patterns</a:t>
-            </a:r>
-          </a:p>
-        </p:txBody>
-      </p:sp>
-      <p:sp>
-        <p:nvSpPr>
-          <p:cNvPr id="3" name="Text Placeholder 2"/>
-          <p:cNvSpPr>
-            <a:spLocks noGrp="1"/>
-          </p:cNvSpPr>
-          <p:nvPr>
-            <p:ph type="body" sz="quarter" idx="10"/>
-          </p:nvPr>
-        </p:nvSpPr>
+              <a:t>HDInsight script actions</a:t>
+            </a:r>
+          </a:p>
+        </p:txBody>
+      </p:sp>
+      <p:pic>
+        <p:nvPicPr>
+          <p:cNvPr id="4" name="Picture 3"/>
+          <p:cNvPicPr>
+            <a:picLocks noChangeAspect="1"/>
+          </p:cNvPicPr>
+          <p:nvPr/>
+        </p:nvPicPr>
+        <p:blipFill>
+          <a:blip r:embed="rId3"/>
+          <a:stretch>
+            <a:fillRect/>
+          </a:stretch>
+        </p:blipFill>
         <p:spPr>
           <a:xfrm>
-            <a:off x="274702" y="1211287"/>
-            <a:ext cx="11888787" cy="3797963"/>
+            <a:off x="1189037" y="1287462"/>
+            <a:ext cx="2973124" cy="5242588"/>
           </a:xfrm>
+          <a:prstGeom prst="rect">
+            <a:avLst/>
+          </a:prstGeom>
         </p:spPr>
-        <p:txBody>
-          <a:bodyPr/>
-          <a:lstStyle/>
-          <a:p>
-            <a:pPr algn="just"/>
-            <a:r>
-              <a:rPr lang="en-US" dirty="0"/>
-              <a:t>Most have a common pattern:</a:t>
-            </a:r>
-          </a:p>
-          <a:p>
-            <a:pPr lvl="1" algn="just"/>
-            <a:r>
-              <a:rPr lang="en-US" dirty="0"/>
-              <a:t>Initialize “big” data across workers (paths, images, …)</a:t>
-            </a:r>
-          </a:p>
-          <a:p>
-            <a:pPr lvl="1" algn="just"/>
-            <a:r>
-              <a:rPr lang="en-US" dirty="0"/>
-              <a:t>Initialize local state on each worker (models, devices, …)</a:t>
-            </a:r>
-          </a:p>
-          <a:p>
-            <a:pPr lvl="1" algn="just"/>
-            <a:r>
-              <a:rPr lang="en-US" dirty="0"/>
-              <a:t>Each worker operates on the data </a:t>
-            </a:r>
-          </a:p>
-          <a:p>
-            <a:pPr algn="just"/>
-            <a:r>
-              <a:rPr lang="en-US" dirty="0"/>
-              <a:t>Image ingest at scale</a:t>
-            </a:r>
-          </a:p>
-          <a:p>
-            <a:pPr lvl="1" algn="just"/>
-            <a:r>
-              <a:rPr lang="en-US" dirty="0" err="1"/>
-              <a:t>image_dir</a:t>
-            </a:r>
-            <a:r>
-              <a:rPr lang="en-US" dirty="0"/>
-              <a:t> = </a:t>
-            </a:r>
-          </a:p>
-          <a:p>
-            <a:pPr algn="just"/>
-            <a:r>
-              <a:rPr lang="en-US" dirty="0"/>
-              <a:t>Image pre-processing</a:t>
-            </a:r>
-          </a:p>
-        </p:txBody>
-      </p:sp>
+      </p:pic>
+      <p:pic>
+        <p:nvPicPr>
+          <p:cNvPr id="5" name="Picture 4"/>
+          <p:cNvPicPr>
+            <a:picLocks noChangeAspect="1"/>
+          </p:cNvPicPr>
+          <p:nvPr/>
+        </p:nvPicPr>
+        <p:blipFill>
+          <a:blip r:embed="rId4"/>
+          <a:stretch>
+            <a:fillRect/>
+          </a:stretch>
+        </p:blipFill>
+        <p:spPr>
+          <a:xfrm>
+            <a:off x="4694237" y="2049462"/>
+            <a:ext cx="3321041" cy="2295525"/>
+          </a:xfrm>
+          <a:prstGeom prst="rect">
+            <a:avLst/>
+          </a:prstGeom>
+        </p:spPr>
+      </p:pic>
+      <p:pic>
+        <p:nvPicPr>
+          <p:cNvPr id="6" name="Picture 5"/>
+          <p:cNvPicPr>
+            <a:picLocks noChangeAspect="1"/>
+          </p:cNvPicPr>
+          <p:nvPr/>
+        </p:nvPicPr>
+        <p:blipFill>
+          <a:blip r:embed="rId5"/>
+          <a:stretch>
+            <a:fillRect/>
+          </a:stretch>
+        </p:blipFill>
+        <p:spPr>
+          <a:xfrm>
+            <a:off x="8547354" y="1212849"/>
+            <a:ext cx="3206019" cy="5173662"/>
+          </a:xfrm>
+          <a:prstGeom prst="rect">
+            <a:avLst/>
+          </a:prstGeom>
+        </p:spPr>
+      </p:pic>
     </p:spTree>
     <p:extLst>
       <p:ext uri="{BB962C8B-B14F-4D97-AF65-F5344CB8AC3E}">
-        <p14:creationId xmlns:p14="http://schemas.microsoft.com/office/powerpoint/2010/main" val="2967531431"/>
+        <p14:creationId xmlns:p14="http://schemas.microsoft.com/office/powerpoint/2010/main" val="3832276797"/>
       </p:ext>
     </p:extLst>
   </p:cSld>
@@ -16765,6 +16886,171 @@
   <p:transition>
     <p:fade/>
   </p:transition>
+  <p:timing>
+    <p:tnLst>
+      <p:par>
+        <p:cTn id="1" dur="indefinite" restart="never" nodeType="tmRoot">
+          <p:childTnLst>
+            <p:seq concurrent="1" nextAc="seek">
+              <p:cTn id="2" dur="indefinite" nodeType="mainSeq">
+                <p:childTnLst>
+                  <p:par>
+                    <p:cTn id="3" fill="hold">
+                      <p:stCondLst>
+                        <p:cond delay="indefinite"/>
+                      </p:stCondLst>
+                      <p:childTnLst>
+                        <p:par>
+                          <p:cTn id="4" fill="hold">
+                            <p:stCondLst>
+                              <p:cond delay="0"/>
+                            </p:stCondLst>
+                            <p:childTnLst>
+                              <p:par>
+                                <p:cTn id="5" presetID="1" presetClass="entr" presetSubtype="0" fill="hold" nodeType="clickEffect">
+                                  <p:stCondLst>
+                                    <p:cond delay="0"/>
+                                  </p:stCondLst>
+                                  <p:childTnLst>
+                                    <p:set>
+                                      <p:cBhvr>
+                                        <p:cTn id="6" dur="1" fill="hold">
+                                          <p:stCondLst>
+                                            <p:cond delay="0"/>
+                                          </p:stCondLst>
+                                        </p:cTn>
+                                        <p:tgtEl>
+                                          <p:spTgt spid="4"/>
+                                        </p:tgtEl>
+                                        <p:attrNameLst>
+                                          <p:attrName>style.visibility</p:attrName>
+                                        </p:attrNameLst>
+                                      </p:cBhvr>
+                                      <p:to>
+                                        <p:strVal val="visible"/>
+                                      </p:to>
+                                    </p:set>
+                                  </p:childTnLst>
+                                </p:cTn>
+                              </p:par>
+                            </p:childTnLst>
+                          </p:cTn>
+                        </p:par>
+                      </p:childTnLst>
+                    </p:cTn>
+                  </p:par>
+                  <p:par>
+                    <p:cTn id="7" fill="hold">
+                      <p:stCondLst>
+                        <p:cond delay="indefinite"/>
+                      </p:stCondLst>
+                      <p:childTnLst>
+                        <p:par>
+                          <p:cTn id="8" fill="hold">
+                            <p:stCondLst>
+                              <p:cond delay="0"/>
+                            </p:stCondLst>
+                            <p:childTnLst>
+                              <p:par>
+                                <p:cTn id="9" presetID="1" presetClass="entr" presetSubtype="0" fill="hold" nodeType="clickEffect">
+                                  <p:stCondLst>
+                                    <p:cond delay="0"/>
+                                  </p:stCondLst>
+                                  <p:childTnLst>
+                                    <p:set>
+                                      <p:cBhvr>
+                                        <p:cTn id="10" dur="1" fill="hold">
+                                          <p:stCondLst>
+                                            <p:cond delay="0"/>
+                                          </p:stCondLst>
+                                        </p:cTn>
+                                        <p:tgtEl>
+                                          <p:spTgt spid="5"/>
+                                        </p:tgtEl>
+                                        <p:attrNameLst>
+                                          <p:attrName>style.visibility</p:attrName>
+                                        </p:attrNameLst>
+                                      </p:cBhvr>
+                                      <p:to>
+                                        <p:strVal val="visible"/>
+                                      </p:to>
+                                    </p:set>
+                                  </p:childTnLst>
+                                </p:cTn>
+                              </p:par>
+                            </p:childTnLst>
+                          </p:cTn>
+                        </p:par>
+                      </p:childTnLst>
+                    </p:cTn>
+                  </p:par>
+                  <p:par>
+                    <p:cTn id="11" fill="hold">
+                      <p:stCondLst>
+                        <p:cond delay="indefinite"/>
+                      </p:stCondLst>
+                      <p:childTnLst>
+                        <p:par>
+                          <p:cTn id="12" fill="hold">
+                            <p:stCondLst>
+                              <p:cond delay="0"/>
+                            </p:stCondLst>
+                            <p:childTnLst>
+                              <p:par>
+                                <p:cTn id="13" presetID="1" presetClass="entr" presetSubtype="0" fill="hold" nodeType="clickEffect">
+                                  <p:stCondLst>
+                                    <p:cond delay="0"/>
+                                  </p:stCondLst>
+                                  <p:childTnLst>
+                                    <p:set>
+                                      <p:cBhvr>
+                                        <p:cTn id="14" dur="1" fill="hold">
+                                          <p:stCondLst>
+                                            <p:cond delay="0"/>
+                                          </p:stCondLst>
+                                        </p:cTn>
+                                        <p:tgtEl>
+                                          <p:spTgt spid="6"/>
+                                        </p:tgtEl>
+                                        <p:attrNameLst>
+                                          <p:attrName>style.visibility</p:attrName>
+                                        </p:attrNameLst>
+                                      </p:cBhvr>
+                                      <p:to>
+                                        <p:strVal val="visible"/>
+                                      </p:to>
+                                    </p:set>
+                                  </p:childTnLst>
+                                </p:cTn>
+                              </p:par>
+                            </p:childTnLst>
+                          </p:cTn>
+                        </p:par>
+                      </p:childTnLst>
+                    </p:cTn>
+                  </p:par>
+                </p:childTnLst>
+              </p:cTn>
+              <p:prevCondLst>
+                <p:cond evt="onPrev" delay="0">
+                  <p:tgtEl>
+                    <p:sldTgt/>
+                  </p:tgtEl>
+                </p:cond>
+              </p:prevCondLst>
+              <p:nextCondLst>
+                <p:cond evt="onNext" delay="0">
+                  <p:tgtEl>
+                    <p:sldTgt/>
+                  </p:tgtEl>
+                </p:cond>
+              </p:nextCondLst>
+            </p:seq>
+          </p:childTnLst>
+        </p:cTn>
+      </p:par>
+    </p:tnLst>
+  </p:timing>
 </p:sld>
 </file>
 
@@ -16820,7 +17106,7 @@
         <p:spPr>
           <a:xfrm>
             <a:off x="274702" y="1211287"/>
-            <a:ext cx="11888787" cy="4912114"/>
+            <a:ext cx="11888787" cy="4136517"/>
           </a:xfrm>
         </p:spPr>
         <p:txBody>
@@ -16835,75 +17121,66 @@
           </a:p>
           <a:p>
             <a:pPr lvl="1" algn="just"/>
-            <a:r>
-              <a:rPr lang="en-US" dirty="0"/>
-              <a:t>Uses a Bash script action to install CNTK on all nodes</a:t>
-            </a:r>
-          </a:p>
-          <a:p>
-            <a:pPr lvl="1" algn="just"/>
-            <a:r>
-              <a:rPr lang="en-US" dirty="0"/>
-              <a:t>Configures Livy and Jupyter kernels</a:t>
-            </a:r>
-          </a:p>
-          <a:p>
-            <a:pPr lvl="1"/>
-            <a:r>
-              <a:rPr lang="en-US" dirty="0"/>
-              <a:t>See walkthrough here: </a:t>
-            </a:r>
             <a:r>
               <a:rPr lang="en-US" dirty="0">
                 <a:hlinkClick r:id="rId3"/>
               </a:rPr>
-              <a:t>https://docs.microsoft.com/en-us/azure/hdinsight/hdinsight-apache-spark-microsoft-cognitive-toolkit</a:t>
+              <a:t>http://aka.ms/cntk-hdinsight</a:t>
             </a:r>
             <a:endParaRPr lang="en-US" dirty="0"/>
           </a:p>
           <a:p>
+            <a:pPr lvl="1" algn="just"/>
+            <a:r>
+              <a:rPr lang="en-US" dirty="0"/>
+              <a:t>Uses a Bash script action to install CNTK on all nodes</a:t>
+            </a:r>
+          </a:p>
+          <a:p>
+            <a:pPr lvl="1" algn="just"/>
+            <a:r>
+              <a:rPr lang="en-US" dirty="0"/>
+              <a:t>Configures Livy and Jupyter kernels</a:t>
+            </a:r>
+          </a:p>
+          <a:p>
             <a:pPr algn="just"/>
             <a:r>
-              <a:rPr lang="en-US" dirty="0" err="1"/>
+              <a:rPr lang="en-US" dirty="0"/>
               <a:t>Databricks</a:t>
             </a:r>
-            <a:endParaRPr lang="en-US" dirty="0"/>
           </a:p>
           <a:p>
             <a:pPr lvl="1" algn="just"/>
-            <a:r>
-              <a:rPr lang="en-US" dirty="0"/>
-              <a:t>Uses a “</a:t>
-            </a:r>
-            <a:r>
-              <a:rPr lang="en-US" dirty="0" err="1"/>
-              <a:t>init</a:t>
-            </a:r>
-            <a:r>
-              <a:rPr lang="en-US" dirty="0"/>
-              <a:t>” script to setup CNTK on all nodes</a:t>
-            </a:r>
-          </a:p>
-          <a:p>
-            <a:pPr lvl="1" algn="just"/>
-            <a:r>
-              <a:rPr lang="en-US" dirty="0"/>
-              <a:t>Nodes can be GPU-enabled</a:t>
-            </a:r>
-          </a:p>
-          <a:p>
-            <a:pPr lvl="1" algn="just"/>
-            <a:r>
-              <a:rPr lang="en-US" dirty="0"/>
-              <a:t>See walkthrough here: </a:t>
-            </a:r>
             <a:r>
               <a:rPr lang="en-US" dirty="0">
                 <a:hlinkClick r:id="rId4"/>
               </a:rPr>
-              <a:t>https://docs.databricks.com/applications/deep-learning/cntk.html</a:t>
+              <a:t>http://aka.ms/cntk-databricks</a:t>
             </a:r>
             <a:endParaRPr lang="en-US" dirty="0"/>
+          </a:p>
+          <a:p>
+            <a:pPr lvl="1" algn="just"/>
+            <a:r>
+              <a:rPr lang="en-US" dirty="0"/>
+              <a:t>Uses a “</a:t>
+            </a:r>
+            <a:r>
+              <a:rPr lang="en-US" dirty="0" err="1"/>
+              <a:t>init</a:t>
+            </a:r>
+            <a:r>
+              <a:rPr lang="en-US" dirty="0"/>
+              <a:t>” script to setup CNTK on all nodes</a:t>
+            </a:r>
+          </a:p>
+          <a:p>
+            <a:pPr lvl="1" algn="just"/>
+            <a:r>
+              <a:rPr lang="en-US" dirty="0"/>
+              <a:t>Nodes can be GPU-enabled</a:t>
+            </a:r>
           </a:p>
         </p:txBody>
       </p:sp>
@@ -16975,7 +17252,7 @@
         <p:spPr>
           <a:xfrm>
             <a:off x="274702" y="1211287"/>
-            <a:ext cx="11888787" cy="683264"/>
+            <a:ext cx="11888787" cy="5607689"/>
           </a:xfrm>
         </p:spPr>
         <p:txBody>
@@ -16984,8 +17261,96 @@
           <a:p>
             <a:r>
               <a:rPr lang="en-US" dirty="0"/>
-              <a:t> </a:t>
-            </a:r>
+              <a:t>“Small” image case:</a:t>
+            </a:r>
+          </a:p>
+          <a:p>
+            <a:pPr lvl="1"/>
+            <a:r>
+              <a:rPr lang="en-US" dirty="0"/>
+              <a:t>All image data can be access from a single driver program</a:t>
+            </a:r>
+          </a:p>
+          <a:p>
+            <a:pPr lvl="1"/>
+            <a:r>
+              <a:rPr lang="en-US" dirty="0"/>
+              <a:t>Iterate over the collection of arrays in the Python driver program</a:t>
+            </a:r>
+          </a:p>
+          <a:p>
+            <a:pPr lvl="1"/>
+            <a:r>
+              <a:rPr lang="en-US" dirty="0"/>
+              <a:t>Use </a:t>
+            </a:r>
+            <a:r>
+              <a:rPr lang="en-US" dirty="0">
+                <a:latin typeface="Consolas" panose="020B0609020204030204" pitchFamily="49" charset="0"/>
+              </a:rPr>
+              <a:t>sc.parallelize</a:t>
+            </a:r>
+            <a:r>
+              <a:rPr lang="en-US" dirty="0"/>
+              <a:t> to distributed it among workers</a:t>
+            </a:r>
+          </a:p>
+          <a:p>
+            <a:r>
+              <a:rPr lang="en-US" dirty="0"/>
+              <a:t>“Large” image case</a:t>
+            </a:r>
+          </a:p>
+          <a:p>
+            <a:pPr lvl="1"/>
+            <a:r>
+              <a:rPr lang="en-US" dirty="0"/>
+              <a:t>Load data in parallel on all workers</a:t>
+            </a:r>
+          </a:p>
+          <a:p>
+            <a:pPr lvl="1"/>
+            <a:r>
+              <a:rPr lang="en-US" dirty="0"/>
+              <a:t>Use </a:t>
+            </a:r>
+            <a:r>
+              <a:rPr lang="en-US" dirty="0">
+                <a:latin typeface="Consolas" panose="020B0609020204030204" pitchFamily="49" charset="0"/>
+              </a:rPr>
+              <a:t>sc.binaryFiles</a:t>
+            </a:r>
+            <a:r>
+              <a:rPr lang="en-US" dirty="0"/>
+              <a:t> to read data into byte array, UDFs to parse it into images – OR –  </a:t>
+            </a:r>
+          </a:p>
+          <a:p>
+            <a:pPr lvl="1"/>
+            <a:r>
+              <a:rPr lang="en-US" dirty="0"/>
+              <a:t>Use </a:t>
+            </a:r>
+            <a:r>
+              <a:rPr lang="en-US" dirty="0">
+                <a:latin typeface="Consolas" panose="020B0609020204030204" pitchFamily="49" charset="0"/>
+              </a:rPr>
+              <a:t>sc.parallelize</a:t>
+            </a:r>
+            <a:r>
+              <a:rPr lang="en-US" dirty="0"/>
+              <a:t> to distribute paths on HDFS to workers</a:t>
+            </a:r>
+          </a:p>
+          <a:p>
+            <a:pPr lvl="1"/>
+            <a:r>
+              <a:rPr lang="en-US" dirty="0"/>
+              <a:t>Copy data from HDFS to local directory, use UDFs to load data in parallel</a:t>
+            </a:r>
+          </a:p>
+          <a:p>
+            <a:endParaRPr lang="en-US" dirty="0"/>
           </a:p>
         </p:txBody>
       </p:sp>
@@ -18037,15 +18402,15 @@
 <file path=customXml/itemProps1.xml><?xml version="1.0" encoding="utf-8"?>
 <ds:datastoreItem xmlns:ds="http://schemas.openxmlformats.org/officeDocument/2006/customXml" ds:itemID="{F990F116-B58F-4255-B05B-DA3808E0E5C6}">
   <ds:schemaRefs>
-    <ds:schemaRef ds:uri="http://purl.org/dc/elements/1.1/"/>
-    <ds:schemaRef ds:uri="http://schemas.microsoft.com/office/2006/metadata/properties"/>
     <ds:schemaRef ds:uri="http://schemas.microsoft.com/office/2006/documentManagement/types"/>
-    <ds:schemaRef ds:uri="http://purl.org/dc/terms/"/>
     <ds:schemaRef ds:uri="http://schemas.openxmlformats.org/package/2006/metadata/core-properties"/>
     <ds:schemaRef ds:uri="630a2e83-186a-4a0f-ab27-bee8a8096abc"/>
     <ds:schemaRef ds:uri="http://purl.org/dc/dcmitype/"/>
     <ds:schemaRef ds:uri="http://schemas.microsoft.com/office/infopath/2007/PartnerControls"/>
+    <ds:schemaRef ds:uri="http://purl.org/dc/elements/1.1/"/>
+    <ds:schemaRef ds:uri="http://schemas.microsoft.com/office/2006/metadata/properties"/>
     <ds:schemaRef ds:uri="http://www.w3.org/XML/1998/namespace"/>
+    <ds:schemaRef ds:uri="http://purl.org/dc/terms/"/>
   </ds:schemaRefs>
 </ds:datastoreItem>
 </file>

</xml_diff>